<commit_message>
Rafael Kapp als Ansprechpartner wurde rausgenommen, war ja nicht die aufgabe. Einige kleine veränderungen in der ppt bezüglich des XP-Plans, war teilweise falsch oder unverständlich.
</commit_message>
<xml_diff>
--- a/ch.bfh.btx8081.w2013.blue/doc/task02/task02.pptx
+++ b/ch.bfh.btx8081.w2013.blue/doc/task02/task02.pptx
@@ -110,7 +110,7 @@
   </p:defaultTextStyle>
   <p:extLst>
     <p:ext uri="{EFAFB233-063F-42B5-8137-9DF3F51BA10A}">
-      <p15:sldGuideLst xmlns="" xmlns:p15="http://schemas.microsoft.com/office/powerpoint/2012/main">
+      <p15:sldGuideLst xmlns:p15="http://schemas.microsoft.com/office/powerpoint/2012/main" xmlns="">
         <p15:guide id="1" orient="horz" pos="2160">
           <p15:clr>
             <a:srgbClr val="A4A3A4"/>
@@ -351,7 +351,7 @@
           <a:p>
             <a:fld id="{7CE38E4D-051A-41E1-86A4-E56916468FD0}" type="datetimeFigureOut">
               <a:rPr lang="en-US" smtClean="0"/>
-              <a:t>27.09.13</a:t>
+              <a:t>9/27/2013</a:t>
             </a:fld>
             <a:endParaRPr lang="en-US"/>
           </a:p>
@@ -685,7 +685,7 @@
           <a:p>
             <a:fld id="{7CE38E4D-051A-41E1-86A4-E56916468FD0}" type="datetimeFigureOut">
               <a:rPr lang="en-US" smtClean="0"/>
-              <a:t>27.09.13</a:t>
+              <a:t>9/27/2013</a:t>
             </a:fld>
             <a:endParaRPr lang="en-US"/>
           </a:p>
@@ -924,7 +924,7 @@
           <a:p>
             <a:fld id="{7CE38E4D-051A-41E1-86A4-E56916468FD0}" type="datetimeFigureOut">
               <a:rPr lang="en-US" smtClean="0"/>
-              <a:t>27.09.13</a:t>
+              <a:t>9/27/2013</a:t>
             </a:fld>
             <a:endParaRPr lang="en-US"/>
           </a:p>
@@ -1224,7 +1224,7 @@
           <a:p>
             <a:fld id="{7CE38E4D-051A-41E1-86A4-E56916468FD0}" type="datetimeFigureOut">
               <a:rPr lang="en-US" smtClean="0"/>
-              <a:t>27.09.13</a:t>
+              <a:t>9/27/2013</a:t>
             </a:fld>
             <a:endParaRPr lang="en-US"/>
           </a:p>
@@ -1440,7 +1440,7 @@
           <a:p>
             <a:fld id="{7CE38E4D-051A-41E1-86A4-E56916468FD0}" type="datetimeFigureOut">
               <a:rPr lang="en-US" smtClean="0"/>
-              <a:t>27.09.13</a:t>
+              <a:t>9/27/2013</a:t>
             </a:fld>
             <a:endParaRPr lang="en-US"/>
           </a:p>
@@ -1800,7 +1800,7 @@
           <a:p>
             <a:fld id="{7CE38E4D-051A-41E1-86A4-E56916468FD0}" type="datetimeFigureOut">
               <a:rPr lang="en-US" smtClean="0"/>
-              <a:t>27.09.13</a:t>
+              <a:t>9/27/2013</a:t>
             </a:fld>
             <a:endParaRPr lang="en-US"/>
           </a:p>
@@ -2067,7 +2067,7 @@
           <a:p>
             <a:fld id="{7CE38E4D-051A-41E1-86A4-E56916468FD0}" type="datetimeFigureOut">
               <a:rPr lang="en-US" smtClean="0"/>
-              <a:t>27.09.13</a:t>
+              <a:t>9/27/2013</a:t>
             </a:fld>
             <a:endParaRPr lang="en-US"/>
           </a:p>
@@ -2157,7 +2157,7 @@
           <a:p>
             <a:fld id="{7CE38E4D-051A-41E1-86A4-E56916468FD0}" type="datetimeFigureOut">
               <a:rPr lang="en-US" smtClean="0"/>
-              <a:t>27.09.13</a:t>
+              <a:t>9/27/2013</a:t>
             </a:fld>
             <a:endParaRPr lang="en-US"/>
           </a:p>
@@ -2458,7 +2458,7 @@
           <a:p>
             <a:fld id="{7CE38E4D-051A-41E1-86A4-E56916468FD0}" type="datetimeFigureOut">
               <a:rPr lang="en-US" smtClean="0"/>
-              <a:t>27.09.13</a:t>
+              <a:t>9/27/2013</a:t>
             </a:fld>
             <a:endParaRPr lang="en-US"/>
           </a:p>
@@ -2764,7 +2764,7 @@
           <a:p>
             <a:fld id="{7CE38E4D-051A-41E1-86A4-E56916468FD0}" type="datetimeFigureOut">
               <a:rPr lang="en-US" smtClean="0"/>
-              <a:t>27.09.13</a:t>
+              <a:t>9/27/2013</a:t>
             </a:fld>
             <a:endParaRPr lang="en-US"/>
           </a:p>
@@ -3044,7 +3044,7 @@
           <a:p>
             <a:fld id="{7CE38E4D-051A-41E1-86A4-E56916468FD0}" type="datetimeFigureOut">
               <a:rPr lang="en-US" smtClean="0"/>
-              <a:t>27.09.13</a:t>
+              <a:t>9/27/2013</a:t>
             </a:fld>
             <a:endParaRPr lang="en-US"/>
           </a:p>
@@ -3452,7 +3452,7 @@
           <a:p>
             <a:fld id="{7CE38E4D-051A-41E1-86A4-E56916468FD0}" type="datetimeFigureOut">
               <a:rPr lang="en-US" smtClean="0"/>
-              <a:t>27.09.13</a:t>
+              <a:t>9/27/2013</a:t>
             </a:fld>
             <a:endParaRPr lang="en-US"/>
           </a:p>
@@ -4012,7 +4012,7 @@
           <a:p>
             <a:fld id="{7CE38E4D-051A-41E1-86A4-E56916468FD0}" type="datetimeFigureOut">
               <a:rPr lang="en-US" smtClean="0"/>
-              <a:t>27.09.13</a:t>
+              <a:t>9/27/2013</a:t>
             </a:fld>
             <a:endParaRPr lang="en-US"/>
           </a:p>
@@ -4160,7 +4160,7 @@
           <a:p>
             <a:fld id="{7CE38E4D-051A-41E1-86A4-E56916468FD0}" type="datetimeFigureOut">
               <a:rPr lang="en-US" smtClean="0"/>
-              <a:t>27.09.13</a:t>
+              <a:t>9/27/2013</a:t>
             </a:fld>
             <a:endParaRPr lang="en-US"/>
           </a:p>
@@ -4250,7 +4250,7 @@
           <a:p>
             <a:fld id="{7CE38E4D-051A-41E1-86A4-E56916468FD0}" type="datetimeFigureOut">
               <a:rPr lang="en-US" smtClean="0"/>
-              <a:t>27.09.13</a:t>
+              <a:t>9/27/2013</a:t>
             </a:fld>
             <a:endParaRPr lang="en-US"/>
           </a:p>
@@ -4592,7 +4592,7 @@
           <a:p>
             <a:fld id="{7CE38E4D-051A-41E1-86A4-E56916468FD0}" type="datetimeFigureOut">
               <a:rPr lang="en-US" smtClean="0"/>
-              <a:t>27.09.13</a:t>
+              <a:t>9/27/2013</a:t>
             </a:fld>
             <a:endParaRPr lang="en-US"/>
           </a:p>
@@ -4801,7 +4801,7 @@
           <a:p>
             <a:fld id="{7CE38E4D-051A-41E1-86A4-E56916468FD0}" type="datetimeFigureOut">
               <a:rPr lang="en-US" smtClean="0"/>
-              <a:t>27.09.13</a:t>
+              <a:t>9/27/2013</a:t>
             </a:fld>
             <a:endParaRPr lang="en-US"/>
           </a:p>
@@ -5380,7 +5380,7 @@
   <p:timing>
     <p:tnLst>
       <p:par>
-        <p:cTn xmlns:p14="http://schemas.microsoft.com/office/powerpoint/2010/main" id="1" dur="indefinite" restart="never" nodeType="tmRoot"/>
+        <p:cTn id="1" dur="indefinite" restart="never" nodeType="tmRoot"/>
       </p:par>
     </p:tnLst>
   </p:timing>
@@ -5536,11 +5536,7 @@
             </a:r>
             <a:r>
               <a:rPr lang="de-DE" dirty="0" smtClean="0"/>
-              <a:t> </a:t>
-            </a:r>
-            <a:r>
-              <a:rPr lang="de-DE" dirty="0" smtClean="0"/>
-              <a:t>(</a:t>
+              <a:t> (</a:t>
             </a:r>
             <a:r>
               <a:rPr lang="de-DE" dirty="0" err="1" smtClean="0"/>
@@ -5914,7 +5910,7 @@
   <p:timing>
     <p:tnLst>
       <p:par>
-        <p:cTn xmlns:p14="http://schemas.microsoft.com/office/powerpoint/2010/main" id="1" dur="indefinite" restart="never" nodeType="tmRoot"/>
+        <p:cTn id="1" dur="indefinite" restart="never" nodeType="tmRoot"/>
       </p:par>
     </p:tnLst>
   </p:timing>
@@ -6521,7 +6517,7 @@
   <p:timing>
     <p:tnLst>
       <p:par>
-        <p:cTn xmlns:p14="http://schemas.microsoft.com/office/powerpoint/2010/main" id="1" dur="indefinite" restart="never" nodeType="tmRoot"/>
+        <p:cTn id="1" dur="indefinite" restart="never" nodeType="tmRoot"/>
       </p:par>
     </p:tnLst>
   </p:timing>
@@ -6746,7 +6742,7 @@
   <p:timing>
     <p:tnLst>
       <p:par>
-        <p:cTn xmlns:p14="http://schemas.microsoft.com/office/powerpoint/2010/main" id="1" dur="indefinite" restart="never" nodeType="tmRoot"/>
+        <p:cTn id="1" dur="indefinite" restart="never" nodeType="tmRoot"/>
       </p:par>
     </p:tnLst>
   </p:timing>
@@ -6815,14 +6811,14 @@
             <p:ph idx="1"/>
             <p:extLst>
               <p:ext uri="{D42A27DB-BD31-4B8C-83A1-F6EECF244321}">
-                <p14:modId xmlns:p14="http://schemas.microsoft.com/office/powerpoint/2010/main" val="889378504"/>
+                <p14:modId xmlns:p14="http://schemas.microsoft.com/office/powerpoint/2010/main" val="2282780004"/>
               </p:ext>
             </p:extLst>
           </p:nvPr>
         </p:nvGraphicFramePr>
         <p:xfrm>
           <a:off x="415925" y="2755900"/>
-          <a:ext cx="8308974" cy="3576319"/>
+          <a:ext cx="8308974" cy="2763520"/>
         </p:xfrm>
         <a:graphic>
           <a:graphicData uri="http://schemas.openxmlformats.org/drawingml/2006/table">
@@ -6969,8 +6965,16 @@
                     <a:p>
                       <a:pPr algn="l"/>
                       <a:r>
-                        <a:rPr lang="de-AT" dirty="0" err="1" smtClean="0"/>
-                        <a:t>complete</a:t>
+                        <a:rPr lang="de-AT" baseline="0" dirty="0" err="1" smtClean="0"/>
+                        <a:t>define</a:t>
+                      </a:r>
+                      <a:r>
+                        <a:rPr lang="de-AT" baseline="0" dirty="0" smtClean="0"/>
+                        <a:t> a </a:t>
+                      </a:r>
+                      <a:r>
+                        <a:rPr lang="de-AT" baseline="0" dirty="0" err="1" smtClean="0"/>
+                        <a:t>deadline</a:t>
                       </a:r>
                       <a:r>
                         <a:rPr lang="de-AT" baseline="0" dirty="0" smtClean="0"/>
@@ -6978,15 +6982,7 @@
                       </a:r>
                       <a:r>
                         <a:rPr lang="de-AT" baseline="0" dirty="0" err="1" smtClean="0"/>
-                        <a:t>project</a:t>
-                      </a:r>
-                      <a:r>
-                        <a:rPr lang="de-AT" baseline="0" dirty="0" smtClean="0"/>
-                        <a:t> </a:t>
-                      </a:r>
-                      <a:r>
-                        <a:rPr lang="de-AT" baseline="0" dirty="0" err="1" smtClean="0"/>
-                        <a:t>within</a:t>
+                        <a:t>for</a:t>
                       </a:r>
                       <a:r>
                         <a:rPr lang="de-AT" baseline="0" dirty="0" smtClean="0"/>
@@ -7002,7 +6998,7 @@
                       </a:r>
                       <a:r>
                         <a:rPr lang="de-AT" baseline="0" dirty="0" err="1" smtClean="0"/>
-                        <a:t>deadline</a:t>
+                        <a:t>project</a:t>
                       </a:r>
                       <a:endParaRPr lang="de-AT" dirty="0"/>
                     </a:p>
@@ -7017,38 +7013,137 @@
                       <a:pPr algn="ctr"/>
                       <a:r>
                         <a:rPr lang="de-AT" dirty="0" err="1" smtClean="0"/>
-                        <a:t>developer</a:t>
+                        <a:t>timeplan</a:t>
                       </a:r>
                       <a:r>
                         <a:rPr lang="de-AT" dirty="0" smtClean="0"/>
                         <a:t> </a:t>
                       </a:r>
                       <a:r>
-                        <a:rPr lang="de-AT" dirty="0" smtClean="0"/>
-                        <a:t>/ </a:t>
+                        <a:rPr lang="de-AT" dirty="0" err="1" smtClean="0"/>
+                        <a:t>for</a:t>
                       </a:r>
                       <a:r>
-                        <a:rPr lang="de-AT" smtClean="0"/>
-                        <a:t>programmer</a:t>
-                      </a:r>
-                      <a:r>
-                        <a:rPr lang="de-AT" baseline="0" smtClean="0"/>
+                        <a:rPr lang="de-AT" dirty="0" smtClean="0"/>
                         <a:t> </a:t>
                       </a:r>
                       <a:r>
+                        <a:rPr lang="de-AT" dirty="0" err="1" smtClean="0"/>
+                        <a:t>tasks</a:t>
+                      </a:r>
+                      <a:endParaRPr lang="de-AT" dirty="0"/>
+                    </a:p>
+                  </a:txBody>
+                  <a:tcPr/>
+                </a:tc>
+                <a:tc>
+                  <a:txBody>
+                    <a:bodyPr/>
+                    <a:lstStyle/>
+                    <a:p>
+                      <a:pPr algn="ctr"/>
+                      <a:r>
+                        <a:rPr lang="de-AT" dirty="0" err="1" smtClean="0"/>
+                        <a:t>customer</a:t>
+                      </a:r>
+                      <a:r>
                         <a:rPr lang="de-AT" baseline="0" dirty="0" smtClean="0"/>
-                        <a:t>/ </a:t>
+                        <a:t> &amp; </a:t>
                       </a:r>
                       <a:r>
                         <a:rPr lang="de-AT" baseline="0" dirty="0" err="1" smtClean="0"/>
-                        <a:t>test</a:t>
+                        <a:t>team</a:t>
+                      </a:r>
+                      <a:endParaRPr lang="de-AT" dirty="0"/>
+                    </a:p>
+                  </a:txBody>
+                  <a:tcPr/>
+                </a:tc>
+              </a:tr>
+              <a:tr h="370840">
+                <a:tc>
+                  <a:txBody>
+                    <a:bodyPr/>
+                    <a:lstStyle/>
+                    <a:p>
+                      <a:pPr algn="l"/>
+                      <a:r>
+                        <a:rPr lang="de-CH" sz="1800" b="0" i="0" kern="1200" dirty="0" err="1" smtClean="0">
+                          <a:solidFill>
+                            <a:schemeClr val="dk1"/>
+                          </a:solidFill>
+                          <a:effectLst/>
+                          <a:latin typeface="+mn-lt"/>
+                          <a:ea typeface="+mn-ea"/>
+                          <a:cs typeface="+mn-cs"/>
+                        </a:rPr>
+                        <a:t>develop</a:t>
+                      </a:r>
+                      <a:r>
+                        <a:rPr lang="de-CH" sz="1800" b="0" i="0" kern="1200" dirty="0" smtClean="0">
+                          <a:solidFill>
+                            <a:schemeClr val="dk1"/>
+                          </a:solidFill>
+                          <a:effectLst/>
+                          <a:latin typeface="+mn-lt"/>
+                          <a:ea typeface="+mn-ea"/>
+                          <a:cs typeface="+mn-cs"/>
+                        </a:rPr>
+                        <a:t>/</a:t>
+                      </a:r>
+                      <a:r>
+                        <a:rPr lang="de-CH" sz="1800" b="0" i="0" kern="1200" dirty="0" err="1" smtClean="0">
+                          <a:solidFill>
+                            <a:schemeClr val="dk1"/>
+                          </a:solidFill>
+                          <a:effectLst/>
+                          <a:latin typeface="+mn-lt"/>
+                          <a:ea typeface="+mn-ea"/>
+                          <a:cs typeface="+mn-cs"/>
+                        </a:rPr>
+                        <a:t>integrate</a:t>
+                      </a:r>
+                      <a:r>
+                        <a:rPr lang="de-CH" sz="1800" b="0" i="0" kern="1200" dirty="0" smtClean="0">
+                          <a:solidFill>
+                            <a:schemeClr val="dk1"/>
+                          </a:solidFill>
+                          <a:effectLst/>
+                          <a:latin typeface="+mn-lt"/>
+                          <a:ea typeface="+mn-ea"/>
+                          <a:cs typeface="+mn-cs"/>
+                        </a:rPr>
+                        <a:t>/</a:t>
+                      </a:r>
+                      <a:r>
+                        <a:rPr lang="de-CH" sz="1800" b="0" i="0" kern="1200" dirty="0" err="1" smtClean="0">
+                          <a:solidFill>
+                            <a:schemeClr val="dk1"/>
+                          </a:solidFill>
+                          <a:effectLst/>
+                          <a:latin typeface="+mn-lt"/>
+                          <a:ea typeface="+mn-ea"/>
+                          <a:cs typeface="+mn-cs"/>
+                        </a:rPr>
+                        <a:t>testing</a:t>
+                      </a:r>
+                      <a:endParaRPr lang="de-AT" dirty="0"/>
+                    </a:p>
+                  </a:txBody>
+                  <a:tcPr/>
+                </a:tc>
+                <a:tc>
+                  <a:txBody>
+                    <a:bodyPr/>
+                    <a:lstStyle/>
+                    <a:p>
+                      <a:pPr algn="ctr"/>
+                      <a:r>
+                        <a:rPr lang="de-AT" dirty="0" smtClean="0"/>
+                        <a:t>test-</a:t>
                       </a:r>
                       <a:r>
                         <a:rPr lang="de-AT" baseline="0" dirty="0" smtClean="0"/>
-                        <a:t> </a:t>
-                      </a:r>
-                      <a:r>
-                        <a:rPr lang="de-AT" baseline="0" dirty="0" err="1" smtClean="0"/>
                         <a:t>software</a:t>
                       </a:r>
                       <a:endParaRPr lang="de-AT" dirty="0"/>
@@ -7080,47 +7175,8 @@
                     <a:p>
                       <a:pPr algn="l"/>
                       <a:r>
-                        <a:rPr lang="de-AT" smtClean="0"/>
-                        <a:t>define test before programming, realization plan</a:t>
-                      </a:r>
-                      <a:endParaRPr lang="de-AT" dirty="0"/>
-                    </a:p>
-                  </a:txBody>
-                  <a:tcPr/>
-                </a:tc>
-                <a:tc>
-                  <a:txBody>
-                    <a:bodyPr/>
-                    <a:lstStyle/>
-                    <a:p>
-                      <a:pPr algn="ctr"/>
-                      <a:r>
                         <a:rPr lang="de-AT" dirty="0" err="1" smtClean="0"/>
-                        <a:t>beta</a:t>
-                      </a:r>
-                      <a:r>
-                        <a:rPr lang="de-AT" baseline="0" dirty="0" smtClean="0"/>
-                        <a:t> </a:t>
-                      </a:r>
-                      <a:r>
-                        <a:rPr lang="de-AT" baseline="0" dirty="0" err="1" smtClean="0"/>
-                        <a:t>releases</a:t>
-                      </a:r>
-                      <a:r>
-                        <a:rPr lang="de-AT" baseline="0" dirty="0" smtClean="0"/>
-                        <a:t> </a:t>
-                      </a:r>
-                      <a:r>
-                        <a:rPr lang="de-AT" baseline="0" dirty="0" err="1" smtClean="0"/>
-                        <a:t>of</a:t>
-                      </a:r>
-                      <a:r>
-                        <a:rPr lang="de-AT" baseline="0" dirty="0" smtClean="0"/>
-                        <a:t> </a:t>
-                      </a:r>
-                      <a:r>
-                        <a:rPr lang="de-AT" baseline="0" dirty="0" err="1" smtClean="0"/>
-                        <a:t>the</a:t>
+                        <a:t>provide</a:t>
                       </a:r>
                       <a:r>
                         <a:rPr lang="de-AT" baseline="0" dirty="0" smtClean="0"/>
@@ -7142,52 +7198,64 @@
                     <a:p>
                       <a:pPr algn="ctr"/>
                       <a:r>
-                        <a:rPr lang="de-AT" dirty="0" err="1" smtClean="0"/>
-                        <a:t>team</a:t>
-                      </a:r>
-                      <a:endParaRPr lang="de-AT" dirty="0"/>
-                    </a:p>
-                  </a:txBody>
-                  <a:tcPr/>
-                </a:tc>
-              </a:tr>
-              <a:tr h="370840">
-                <a:tc>
-                  <a:txBody>
-                    <a:bodyPr/>
-                    <a:lstStyle/>
-                    <a:p>
-                      <a:pPr algn="l"/>
-                      <a:r>
-                        <a:rPr lang="de-AT" smtClean="0"/>
-                        <a:t>provide</a:t>
+                        <a:rPr lang="de-CH" sz="1800" b="0" i="0" u="none" strike="noStrike" kern="1200" dirty="0" err="1" smtClean="0">
+                          <a:solidFill>
+                            <a:schemeClr val="dk1"/>
+                          </a:solidFill>
+                          <a:effectLst/>
+                          <a:latin typeface="+mn-lt"/>
+                          <a:ea typeface="+mn-ea"/>
+                          <a:cs typeface="+mn-cs"/>
+                        </a:rPr>
+                        <a:t>idea</a:t>
                       </a:r>
                       <a:r>
-                        <a:rPr lang="de-AT" baseline="0" smtClean="0"/>
-                        <a:t> software to the customer</a:t>
-                      </a:r>
-                      <a:endParaRPr lang="de-AT" dirty="0"/>
-                    </a:p>
-                  </a:txBody>
-                  <a:tcPr/>
-                </a:tc>
-                <a:tc>
-                  <a:txBody>
-                    <a:bodyPr/>
-                    <a:lstStyle/>
-                    <a:p>
-                      <a:pPr algn="ctr"/>
-                      <a:r>
-                        <a:rPr lang="de-AT" dirty="0" err="1" smtClean="0"/>
-                        <a:t>release</a:t>
-                      </a:r>
-                      <a:r>
-                        <a:rPr lang="de-AT" dirty="0" smtClean="0"/>
+                        <a:rPr lang="de-CH" sz="1800" b="0" i="0" u="none" strike="noStrike" kern="1200" baseline="0" dirty="0" smtClean="0">
+                          <a:solidFill>
+                            <a:schemeClr val="dk1"/>
+                          </a:solidFill>
+                          <a:effectLst/>
+                          <a:latin typeface="+mn-lt"/>
+                          <a:ea typeface="+mn-ea"/>
+                          <a:cs typeface="+mn-cs"/>
+                        </a:rPr>
                         <a:t> </a:t>
                       </a:r>
                       <a:r>
-                        <a:rPr lang="de-AT" dirty="0" err="1" smtClean="0"/>
-                        <a:t>software</a:t>
+                        <a:rPr lang="de-CH" sz="1800" b="0" i="0" u="none" strike="noStrike" kern="1200" baseline="0" dirty="0" err="1" smtClean="0">
+                          <a:solidFill>
+                            <a:schemeClr val="dk1"/>
+                          </a:solidFill>
+                          <a:effectLst/>
+                          <a:latin typeface="+mn-lt"/>
+                          <a:ea typeface="+mn-ea"/>
+                          <a:cs typeface="+mn-cs"/>
+                        </a:rPr>
+                        <a:t>for</a:t>
+                      </a:r>
+                      <a:r>
+                        <a:rPr lang="de-CH" sz="1800" b="0" i="0" u="none" strike="noStrike" kern="1200" baseline="0" dirty="0" smtClean="0">
+                          <a:solidFill>
+                            <a:schemeClr val="dk1"/>
+                          </a:solidFill>
+                          <a:effectLst/>
+                          <a:latin typeface="+mn-lt"/>
+                          <a:ea typeface="+mn-ea"/>
+                          <a:cs typeface="+mn-cs"/>
+                        </a:rPr>
+                        <a:t> </a:t>
+                      </a:r>
+                      <a:r>
+                        <a:rPr lang="de-CH" sz="1800" b="0" i="0" u="none" strike="noStrike" kern="1200" baseline="0" dirty="0" err="1" smtClean="0">
+                          <a:solidFill>
+                            <a:schemeClr val="dk1"/>
+                          </a:solidFill>
+                          <a:effectLst/>
+                          <a:latin typeface="+mn-lt"/>
+                          <a:ea typeface="+mn-ea"/>
+                          <a:cs typeface="+mn-cs"/>
+                        </a:rPr>
+                        <a:t>improvements</a:t>
                       </a:r>
                       <a:endParaRPr lang="de-AT" dirty="0"/>
                     </a:p>
@@ -7204,6 +7272,22 @@
                         <a:rPr lang="de-AT" dirty="0" err="1" smtClean="0"/>
                         <a:t>team</a:t>
                       </a:r>
+                      <a:r>
+                        <a:rPr lang="de-AT" baseline="0" dirty="0" smtClean="0"/>
+                        <a:t> &amp; </a:t>
+                      </a:r>
+                      <a:r>
+                        <a:rPr lang="de-AT" baseline="0" dirty="0" err="1" smtClean="0"/>
+                        <a:t>customer</a:t>
+                      </a:r>
+                      <a:r>
+                        <a:rPr lang="de-AT" baseline="0" dirty="0" smtClean="0"/>
+                        <a:t> &amp; </a:t>
+                      </a:r>
+                      <a:r>
+                        <a:rPr lang="de-AT" baseline="0" dirty="0" err="1" smtClean="0"/>
+                        <a:t>users</a:t>
+                      </a:r>
                       <a:endParaRPr lang="de-AT" dirty="0"/>
                     </a:p>
                   </a:txBody>
@@ -7218,7 +7302,7 @@
                     <a:p>
                       <a:pPr algn="l"/>
                       <a:r>
-                        <a:rPr lang="de-AT" smtClean="0"/>
+                        <a:rPr lang="de-AT" dirty="0" err="1" smtClean="0"/>
                         <a:t>applying</a:t>
                       </a:r>
                       <a:r>
@@ -7266,7 +7350,7 @@
                       <a:pPr algn="ctr"/>
                       <a:r>
                         <a:rPr lang="de-AT" dirty="0" err="1" smtClean="0"/>
-                        <a:t>evaluate</a:t>
+                        <a:t>evaluated</a:t>
                       </a:r>
                       <a:r>
                         <a:rPr lang="de-AT" baseline="0" dirty="0" smtClean="0"/>
@@ -7322,7 +7406,7 @@
   <p:timing>
     <p:tnLst>
       <p:par>
-        <p:cTn xmlns:p14="http://schemas.microsoft.com/office/powerpoint/2010/main" id="1" dur="indefinite" restart="never" nodeType="tmRoot"/>
+        <p:cTn id="1" dur="indefinite" restart="never" nodeType="tmRoot"/>
       </p:par>
     </p:tnLst>
   </p:timing>

</xml_diff>